<commit_message>
update cluspro results analysis
</commit_message>
<xml_diff>
--- a/presentations/2-forces_at_play_in_protein_interactions-2020.pptx
+++ b/presentations/2-forces_at_play_in_protein_interactions-2020.pptx
@@ -235,7 +235,7 @@
           </a:lstStyle>
           <a:p>
             <a:fld id="{90E24C0C-6569-BD45-A72F-043D6BC01BE7}" type="datetimeFigureOut">
-              <a:t>30/04/2020</a:t>
+              <a:t>05/05/2020</a:t>
             </a:fld>
             <a:endParaRPr lang="en-IT"/>
           </a:p>
@@ -734,7 +734,7 @@
           <a:lstStyle/>
           <a:p>
             <a:fld id="{AE29C165-7518-B248-B7AC-FCD5CB29AE65}" type="datetimeFigureOut">
-              <a:t>30/04/2020</a:t>
+              <a:t>05/05/2020</a:t>
             </a:fld>
             <a:endParaRPr lang="en-IT"/>
           </a:p>
@@ -932,7 +932,7 @@
           <a:lstStyle/>
           <a:p>
             <a:fld id="{AE29C165-7518-B248-B7AC-FCD5CB29AE65}" type="datetimeFigureOut">
-              <a:t>30/04/2020</a:t>
+              <a:t>05/05/2020</a:t>
             </a:fld>
             <a:endParaRPr lang="en-IT"/>
           </a:p>
@@ -1140,7 +1140,7 @@
           <a:lstStyle/>
           <a:p>
             <a:fld id="{AE29C165-7518-B248-B7AC-FCD5CB29AE65}" type="datetimeFigureOut">
-              <a:t>30/04/2020</a:t>
+              <a:t>05/05/2020</a:t>
             </a:fld>
             <a:endParaRPr lang="en-IT"/>
           </a:p>
@@ -1338,7 +1338,7 @@
           <a:lstStyle/>
           <a:p>
             <a:fld id="{AE29C165-7518-B248-B7AC-FCD5CB29AE65}" type="datetimeFigureOut">
-              <a:t>30/04/2020</a:t>
+              <a:t>05/05/2020</a:t>
             </a:fld>
             <a:endParaRPr lang="en-IT"/>
           </a:p>
@@ -1612,7 +1612,7 @@
           <a:lstStyle/>
           <a:p>
             <a:fld id="{AE29C165-7518-B248-B7AC-FCD5CB29AE65}" type="datetimeFigureOut">
-              <a:t>30/04/2020</a:t>
+              <a:t>05/05/2020</a:t>
             </a:fld>
             <a:endParaRPr lang="en-IT"/>
           </a:p>
@@ -1878,7 +1878,7 @@
           <a:lstStyle/>
           <a:p>
             <a:fld id="{AE29C165-7518-B248-B7AC-FCD5CB29AE65}" type="datetimeFigureOut">
-              <a:t>30/04/2020</a:t>
+              <a:t>05/05/2020</a:t>
             </a:fld>
             <a:endParaRPr lang="en-IT"/>
           </a:p>
@@ -2291,7 +2291,7 @@
           <a:lstStyle/>
           <a:p>
             <a:fld id="{AE29C165-7518-B248-B7AC-FCD5CB29AE65}" type="datetimeFigureOut">
-              <a:t>30/04/2020</a:t>
+              <a:t>05/05/2020</a:t>
             </a:fld>
             <a:endParaRPr lang="en-IT"/>
           </a:p>
@@ -2431,7 +2431,7 @@
           <a:lstStyle/>
           <a:p>
             <a:fld id="{AE29C165-7518-B248-B7AC-FCD5CB29AE65}" type="datetimeFigureOut">
-              <a:t>30/04/2020</a:t>
+              <a:t>05/05/2020</a:t>
             </a:fld>
             <a:endParaRPr lang="en-IT"/>
           </a:p>
@@ -2542,7 +2542,7 @@
           <a:lstStyle/>
           <a:p>
             <a:fld id="{AE29C165-7518-B248-B7AC-FCD5CB29AE65}" type="datetimeFigureOut">
-              <a:t>30/04/2020</a:t>
+              <a:t>05/05/2020</a:t>
             </a:fld>
             <a:endParaRPr lang="en-IT"/>
           </a:p>
@@ -2853,7 +2853,7 @@
           <a:lstStyle/>
           <a:p>
             <a:fld id="{AE29C165-7518-B248-B7AC-FCD5CB29AE65}" type="datetimeFigureOut">
-              <a:t>30/04/2020</a:t>
+              <a:t>05/05/2020</a:t>
             </a:fld>
             <a:endParaRPr lang="en-IT"/>
           </a:p>
@@ -3140,7 +3140,7 @@
           <a:lstStyle/>
           <a:p>
             <a:fld id="{AE29C165-7518-B248-B7AC-FCD5CB29AE65}" type="datetimeFigureOut">
-              <a:t>30/04/2020</a:t>
+              <a:t>05/05/2020</a:t>
             </a:fld>
             <a:endParaRPr lang="en-IT"/>
           </a:p>
@@ -3381,7 +3381,7 @@
           </a:lstStyle>
           <a:p>
             <a:fld id="{AE29C165-7518-B248-B7AC-FCD5CB29AE65}" type="datetimeFigureOut">
-              <a:t>30/04/2020</a:t>
+              <a:t>05/05/2020</a:t>
             </a:fld>
             <a:endParaRPr lang="en-IT"/>
           </a:p>
@@ -4750,14 +4750,14 @@
           <a:effectLst/>
           <a:extLst>
             <a:ext uri="{909E8E84-426E-40dd-AFC4-6F175D3DCCD1}">
-              <a14:hiddenFill xmlns:a14="http://schemas.microsoft.com/office/drawing/2010/main" xmlns="">
+              <a14:hiddenFill xmlns="" xmlns:a14="http://schemas.microsoft.com/office/drawing/2010/main">
                 <a:solidFill>
                   <a:schemeClr val="accent1"/>
                 </a:solidFill>
               </a14:hiddenFill>
             </a:ext>
             <a:ext uri="{AF507438-7753-43e0-B8FC-AC1667EBCBE1}">
-              <a14:hiddenEffects xmlns:a14="http://schemas.microsoft.com/office/drawing/2010/main" xmlns="">
+              <a14:hiddenEffects xmlns="" xmlns:a14="http://schemas.microsoft.com/office/drawing/2010/main">
                 <a:effectLst>
                   <a:outerShdw blurRad="63500" dist="38099" dir="2700000" algn="ctr" rotWithShape="0">
                     <a:schemeClr val="bg2">
@@ -4812,14 +4812,14 @@
           <a:effectLst/>
           <a:extLst>
             <a:ext uri="{909E8E84-426E-40dd-AFC4-6F175D3DCCD1}">
-              <a14:hiddenFill xmlns:a14="http://schemas.microsoft.com/office/drawing/2010/main" xmlns="">
+              <a14:hiddenFill xmlns="" xmlns:a14="http://schemas.microsoft.com/office/drawing/2010/main">
                 <a:solidFill>
                   <a:schemeClr val="accent1"/>
                 </a:solidFill>
               </a14:hiddenFill>
             </a:ext>
             <a:ext uri="{91240B29-F687-4f45-9708-019B960494DF}">
-              <a14:hiddenLine xmlns:a14="http://schemas.microsoft.com/office/drawing/2010/main" xmlns="" w="9525">
+              <a14:hiddenLine xmlns="" xmlns:a14="http://schemas.microsoft.com/office/drawing/2010/main" w="9525">
                 <a:solidFill>
                   <a:schemeClr val="tx1"/>
                 </a:solidFill>
@@ -4829,7 +4829,7 @@
               </a14:hiddenLine>
             </a:ext>
             <a:ext uri="{AF507438-7753-43e0-B8FC-AC1667EBCBE1}">
-              <a14:hiddenEffects xmlns:a14="http://schemas.microsoft.com/office/drawing/2010/main" xmlns="">
+              <a14:hiddenEffects xmlns="" xmlns:a14="http://schemas.microsoft.com/office/drawing/2010/main">
                 <a:effectLst>
                   <a:outerShdw blurRad="63500" dist="38099" dir="2700000" algn="ctr" rotWithShape="0">
                     <a:schemeClr val="bg2">
@@ -4892,14 +4892,14 @@
           <a:effectLst/>
           <a:extLst>
             <a:ext uri="{909E8E84-426E-40dd-AFC4-6F175D3DCCD1}">
-              <a14:hiddenFill xmlns:a14="http://schemas.microsoft.com/office/drawing/2010/main" xmlns="">
+              <a14:hiddenFill xmlns="" xmlns:a14="http://schemas.microsoft.com/office/drawing/2010/main">
                 <a:solidFill>
                   <a:schemeClr val="accent1"/>
                 </a:solidFill>
               </a14:hiddenFill>
             </a:ext>
             <a:ext uri="{91240B29-F687-4f45-9708-019B960494DF}">
-              <a14:hiddenLine xmlns:a14="http://schemas.microsoft.com/office/drawing/2010/main" xmlns="" w="9525">
+              <a14:hiddenLine xmlns="" xmlns:a14="http://schemas.microsoft.com/office/drawing/2010/main" w="9525">
                 <a:solidFill>
                   <a:schemeClr val="tx1"/>
                 </a:solidFill>
@@ -4909,7 +4909,7 @@
               </a14:hiddenLine>
             </a:ext>
             <a:ext uri="{AF507438-7753-43e0-B8FC-AC1667EBCBE1}">
-              <a14:hiddenEffects xmlns:a14="http://schemas.microsoft.com/office/drawing/2010/main" xmlns="">
+              <a14:hiddenEffects xmlns="" xmlns:a14="http://schemas.microsoft.com/office/drawing/2010/main">
                 <a:effectLst>
                   <a:outerShdw blurRad="63500" dist="38099" dir="2700000" algn="ctr" rotWithShape="0">
                     <a:schemeClr val="bg2">
@@ -4972,14 +4972,14 @@
           <a:effectLst/>
           <a:extLst>
             <a:ext uri="{909E8E84-426E-40dd-AFC4-6F175D3DCCD1}">
-              <a14:hiddenFill xmlns:a14="http://schemas.microsoft.com/office/drawing/2010/main" xmlns="">
+              <a14:hiddenFill xmlns="" xmlns:a14="http://schemas.microsoft.com/office/drawing/2010/main">
                 <a:solidFill>
                   <a:schemeClr val="accent1"/>
                 </a:solidFill>
               </a14:hiddenFill>
             </a:ext>
             <a:ext uri="{91240B29-F687-4f45-9708-019B960494DF}">
-              <a14:hiddenLine xmlns:a14="http://schemas.microsoft.com/office/drawing/2010/main" xmlns="" w="9525">
+              <a14:hiddenLine xmlns="" xmlns:a14="http://schemas.microsoft.com/office/drawing/2010/main" w="9525">
                 <a:solidFill>
                   <a:schemeClr val="tx1"/>
                 </a:solidFill>
@@ -4989,7 +4989,7 @@
               </a14:hiddenLine>
             </a:ext>
             <a:ext uri="{AF507438-7753-43e0-B8FC-AC1667EBCBE1}">
-              <a14:hiddenEffects xmlns:a14="http://schemas.microsoft.com/office/drawing/2010/main" xmlns="">
+              <a14:hiddenEffects xmlns="" xmlns:a14="http://schemas.microsoft.com/office/drawing/2010/main">
                 <a:effectLst>
                   <a:outerShdw blurRad="63500" dist="38099" dir="2700000" algn="ctr" rotWithShape="0">
                     <a:schemeClr val="bg2">
@@ -5046,12 +5046,12 @@
           <a:effectLst/>
           <a:extLst>
             <a:ext uri="{909E8E84-426E-40dd-AFC4-6F175D3DCCD1}">
-              <a14:hiddenFill xmlns:a14="http://schemas.microsoft.com/office/drawing/2010/main" xmlns="">
+              <a14:hiddenFill xmlns="" xmlns:a14="http://schemas.microsoft.com/office/drawing/2010/main">
                 <a:noFill/>
               </a14:hiddenFill>
             </a:ext>
             <a:ext uri="{AF507438-7753-43e0-B8FC-AC1667EBCBE1}">
-              <a14:hiddenEffects xmlns:a14="http://schemas.microsoft.com/office/drawing/2010/main" xmlns="">
+              <a14:hiddenEffects xmlns="" xmlns:a14="http://schemas.microsoft.com/office/drawing/2010/main">
                 <a:effectLst>
                   <a:outerShdw blurRad="63500" dist="38099" dir="2700000" algn="ctr" rotWithShape="0">
                     <a:schemeClr val="bg2">
@@ -5094,14 +5094,14 @@
           <a:effectLst/>
           <a:extLst>
             <a:ext uri="{909E8E84-426E-40dd-AFC4-6F175D3DCCD1}">
-              <a14:hiddenFill xmlns:a14="http://schemas.microsoft.com/office/drawing/2010/main" xmlns="">
+              <a14:hiddenFill xmlns="" xmlns:a14="http://schemas.microsoft.com/office/drawing/2010/main">
                 <a:solidFill>
                   <a:schemeClr val="accent1"/>
                 </a:solidFill>
               </a14:hiddenFill>
             </a:ext>
             <a:ext uri="{91240B29-F687-4f45-9708-019B960494DF}">
-              <a14:hiddenLine xmlns:a14="http://schemas.microsoft.com/office/drawing/2010/main" xmlns="" w="9525">
+              <a14:hiddenLine xmlns="" xmlns:a14="http://schemas.microsoft.com/office/drawing/2010/main" w="9525">
                 <a:solidFill>
                   <a:schemeClr val="tx1"/>
                 </a:solidFill>
@@ -5111,7 +5111,7 @@
               </a14:hiddenLine>
             </a:ext>
             <a:ext uri="{AF507438-7753-43e0-B8FC-AC1667EBCBE1}">
-              <a14:hiddenEffects xmlns:a14="http://schemas.microsoft.com/office/drawing/2010/main" xmlns="">
+              <a14:hiddenEffects xmlns="" xmlns:a14="http://schemas.microsoft.com/office/drawing/2010/main">
                 <a:effectLst>
                   <a:outerShdw blurRad="63500" dist="38099" dir="2700000" algn="ctr" rotWithShape="0">
                     <a:schemeClr val="bg2">
@@ -5185,7 +5185,7 @@
           <a:effectLst/>
           <a:extLst>
             <a:ext uri="{91240B29-F687-4f45-9708-019B960494DF}">
-              <a14:hiddenLine xmlns:a14="http://schemas.microsoft.com/office/drawing/2010/main" xmlns="" w="9525">
+              <a14:hiddenLine xmlns="" xmlns:a14="http://schemas.microsoft.com/office/drawing/2010/main" w="9525">
                 <a:solidFill>
                   <a:schemeClr val="tx1"/>
                 </a:solidFill>
@@ -5195,7 +5195,7 @@
               </a14:hiddenLine>
             </a:ext>
             <a:ext uri="{AF507438-7753-43e0-B8FC-AC1667EBCBE1}">
-              <a14:hiddenEffects xmlns:a14="http://schemas.microsoft.com/office/drawing/2010/main" xmlns="">
+              <a14:hiddenEffects xmlns="" xmlns:a14="http://schemas.microsoft.com/office/drawing/2010/main">
                 <a:effectLst>
                   <a:outerShdw blurRad="63500" dist="38099" dir="2700000" algn="ctr" rotWithShape="0">
                     <a:schemeClr val="bg2">
@@ -6255,7 +6255,7 @@
           <a:effectLst/>
           <a:extLst>
             <a:ext uri="{91240B29-F687-4f45-9708-019B960494DF}">
-              <a14:hiddenLine xmlns:a14="http://schemas.microsoft.com/office/drawing/2010/main" xmlns="" w="9525">
+              <a14:hiddenLine xmlns="" xmlns:a14="http://schemas.microsoft.com/office/drawing/2010/main" w="9525">
                 <a:solidFill>
                   <a:schemeClr val="tx1"/>
                 </a:solidFill>
@@ -6265,7 +6265,7 @@
               </a14:hiddenLine>
             </a:ext>
             <a:ext uri="{AF507438-7753-43e0-B8FC-AC1667EBCBE1}">
-              <a14:hiddenEffects xmlns:a14="http://schemas.microsoft.com/office/drawing/2010/main" xmlns="">
+              <a14:hiddenEffects xmlns="" xmlns:a14="http://schemas.microsoft.com/office/drawing/2010/main">
                 <a:effectLst>
                   <a:outerShdw blurRad="63500" dist="38099" dir="2700000" algn="ctr" rotWithShape="0">
                     <a:schemeClr val="bg2">
@@ -6318,14 +6318,14 @@
           <a:effectLst/>
           <a:extLst>
             <a:ext uri="{909E8E84-426E-40dd-AFC4-6F175D3DCCD1}">
-              <a14:hiddenFill xmlns:a14="http://schemas.microsoft.com/office/drawing/2010/main" xmlns="">
+              <a14:hiddenFill xmlns="" xmlns:a14="http://schemas.microsoft.com/office/drawing/2010/main">
                 <a:solidFill>
                   <a:schemeClr val="accent1"/>
                 </a:solidFill>
               </a14:hiddenFill>
             </a:ext>
             <a:ext uri="{AF507438-7753-43e0-B8FC-AC1667EBCBE1}">
-              <a14:hiddenEffects xmlns:a14="http://schemas.microsoft.com/office/drawing/2010/main" xmlns="">
+              <a14:hiddenEffects xmlns="" xmlns:a14="http://schemas.microsoft.com/office/drawing/2010/main">
                 <a:effectLst>
                   <a:outerShdw blurRad="63500" dist="38099" dir="2700000" algn="ctr" rotWithShape="0">
                     <a:schemeClr val="bg2">
@@ -6401,14 +6401,14 @@
           <a:effectLst/>
           <a:extLst>
             <a:ext uri="{909E8E84-426E-40dd-AFC4-6F175D3DCCD1}">
-              <a14:hiddenFill xmlns:a14="http://schemas.microsoft.com/office/drawing/2010/main" xmlns="">
+              <a14:hiddenFill xmlns="" xmlns:a14="http://schemas.microsoft.com/office/drawing/2010/main">
                 <a:solidFill>
                   <a:schemeClr val="accent1"/>
                 </a:solidFill>
               </a14:hiddenFill>
             </a:ext>
             <a:ext uri="{91240B29-F687-4f45-9708-019B960494DF}">
-              <a14:hiddenLine xmlns:a14="http://schemas.microsoft.com/office/drawing/2010/main" xmlns="" w="9525">
+              <a14:hiddenLine xmlns="" xmlns:a14="http://schemas.microsoft.com/office/drawing/2010/main" w="9525">
                 <a:solidFill>
                   <a:schemeClr val="tx1"/>
                 </a:solidFill>
@@ -6418,7 +6418,7 @@
               </a14:hiddenLine>
             </a:ext>
             <a:ext uri="{AF507438-7753-43e0-B8FC-AC1667EBCBE1}">
-              <a14:hiddenEffects xmlns:a14="http://schemas.microsoft.com/office/drawing/2010/main" xmlns="">
+              <a14:hiddenEffects xmlns="" xmlns:a14="http://schemas.microsoft.com/office/drawing/2010/main">
                 <a:effectLst>
                   <a:outerShdw blurRad="63500" dist="38099" dir="2700000" algn="ctr" rotWithShape="0">
                     <a:schemeClr val="bg2">
@@ -6489,14 +6489,14 @@
           <a:effectLst/>
           <a:extLst>
             <a:ext uri="{909E8E84-426E-40dd-AFC4-6F175D3DCCD1}">
-              <a14:hiddenFill xmlns:a14="http://schemas.microsoft.com/office/drawing/2010/main" xmlns="">
+              <a14:hiddenFill xmlns="" xmlns:a14="http://schemas.microsoft.com/office/drawing/2010/main">
                 <a:solidFill>
                   <a:schemeClr val="accent1"/>
                 </a:solidFill>
               </a14:hiddenFill>
             </a:ext>
             <a:ext uri="{91240B29-F687-4f45-9708-019B960494DF}">
-              <a14:hiddenLine xmlns:a14="http://schemas.microsoft.com/office/drawing/2010/main" xmlns="" w="9525">
+              <a14:hiddenLine xmlns="" xmlns:a14="http://schemas.microsoft.com/office/drawing/2010/main" w="9525">
                 <a:solidFill>
                   <a:schemeClr val="tx1"/>
                 </a:solidFill>
@@ -6506,7 +6506,7 @@
               </a14:hiddenLine>
             </a:ext>
             <a:ext uri="{AF507438-7753-43e0-B8FC-AC1667EBCBE1}">
-              <a14:hiddenEffects xmlns:a14="http://schemas.microsoft.com/office/drawing/2010/main" xmlns="">
+              <a14:hiddenEffects xmlns="" xmlns:a14="http://schemas.microsoft.com/office/drawing/2010/main">
                 <a:effectLst>
                   <a:outerShdw blurRad="63500" dist="38099" dir="2700000" algn="ctr" rotWithShape="0">
                     <a:schemeClr val="bg2">
@@ -6593,14 +6593,14 @@
           <a:effectLst/>
           <a:extLst>
             <a:ext uri="{909E8E84-426E-40dd-AFC4-6F175D3DCCD1}">
-              <a14:hiddenFill xmlns:a14="http://schemas.microsoft.com/office/drawing/2010/main" xmlns="">
+              <a14:hiddenFill xmlns="" xmlns:a14="http://schemas.microsoft.com/office/drawing/2010/main">
                 <a:solidFill>
                   <a:schemeClr val="accent1"/>
                 </a:solidFill>
               </a14:hiddenFill>
             </a:ext>
             <a:ext uri="{91240B29-F687-4f45-9708-019B960494DF}">
-              <a14:hiddenLine xmlns:a14="http://schemas.microsoft.com/office/drawing/2010/main" xmlns="" w="9525">
+              <a14:hiddenLine xmlns="" xmlns:a14="http://schemas.microsoft.com/office/drawing/2010/main" w="9525">
                 <a:solidFill>
                   <a:schemeClr val="tx1"/>
                 </a:solidFill>
@@ -6610,7 +6610,7 @@
               </a14:hiddenLine>
             </a:ext>
             <a:ext uri="{AF507438-7753-43e0-B8FC-AC1667EBCBE1}">
-              <a14:hiddenEffects xmlns:a14="http://schemas.microsoft.com/office/drawing/2010/main" xmlns="">
+              <a14:hiddenEffects xmlns="" xmlns:a14="http://schemas.microsoft.com/office/drawing/2010/main">
                 <a:effectLst>
                   <a:outerShdw blurRad="63500" dist="38099" dir="2700000" algn="ctr" rotWithShape="0">
                     <a:schemeClr val="bg2">
@@ -6701,14 +6701,14 @@
           <a:effectLst/>
           <a:extLst>
             <a:ext uri="{909E8E84-426E-40dd-AFC4-6F175D3DCCD1}">
-              <a14:hiddenFill xmlns:a14="http://schemas.microsoft.com/office/drawing/2010/main" xmlns="">
+              <a14:hiddenFill xmlns="" xmlns:a14="http://schemas.microsoft.com/office/drawing/2010/main">
                 <a:solidFill>
                   <a:schemeClr val="accent1"/>
                 </a:solidFill>
               </a14:hiddenFill>
             </a:ext>
             <a:ext uri="{AF507438-7753-43e0-B8FC-AC1667EBCBE1}">
-              <a14:hiddenEffects xmlns:a14="http://schemas.microsoft.com/office/drawing/2010/main" xmlns="">
+              <a14:hiddenEffects xmlns="" xmlns:a14="http://schemas.microsoft.com/office/drawing/2010/main">
                 <a:effectLst>
                   <a:outerShdw blurRad="63500" dist="38099" dir="2700000" algn="ctr" rotWithShape="0">
                     <a:schemeClr val="bg2">
@@ -6756,12 +6756,12 @@
           <a:effectLst/>
           <a:extLst>
             <a:ext uri="{909E8E84-426E-40dd-AFC4-6F175D3DCCD1}">
-              <a14:hiddenFill xmlns:a14="http://schemas.microsoft.com/office/drawing/2010/main" xmlns="">
+              <a14:hiddenFill xmlns="" xmlns:a14="http://schemas.microsoft.com/office/drawing/2010/main">
                 <a:noFill/>
               </a14:hiddenFill>
             </a:ext>
             <a:ext uri="{AF507438-7753-43e0-B8FC-AC1667EBCBE1}">
-              <a14:hiddenEffects xmlns:a14="http://schemas.microsoft.com/office/drawing/2010/main" xmlns="">
+              <a14:hiddenEffects xmlns="" xmlns:a14="http://schemas.microsoft.com/office/drawing/2010/main">
                 <a:effectLst>
                   <a:outerShdw blurRad="63500" dist="38099" dir="2700000" algn="ctr" rotWithShape="0">
                     <a:schemeClr val="bg2">
@@ -6804,14 +6804,14 @@
           <a:effectLst/>
           <a:extLst>
             <a:ext uri="{909E8E84-426E-40dd-AFC4-6F175D3DCCD1}">
-              <a14:hiddenFill xmlns:a14="http://schemas.microsoft.com/office/drawing/2010/main" xmlns="">
+              <a14:hiddenFill xmlns="" xmlns:a14="http://schemas.microsoft.com/office/drawing/2010/main">
                 <a:solidFill>
                   <a:schemeClr val="accent1"/>
                 </a:solidFill>
               </a14:hiddenFill>
             </a:ext>
             <a:ext uri="{91240B29-F687-4f45-9708-019B960494DF}">
-              <a14:hiddenLine xmlns:a14="http://schemas.microsoft.com/office/drawing/2010/main" xmlns="" w="9525">
+              <a14:hiddenLine xmlns="" xmlns:a14="http://schemas.microsoft.com/office/drawing/2010/main" w="9525">
                 <a:solidFill>
                   <a:schemeClr val="tx1"/>
                 </a:solidFill>
@@ -6821,7 +6821,7 @@
               </a14:hiddenLine>
             </a:ext>
             <a:ext uri="{AF507438-7753-43e0-B8FC-AC1667EBCBE1}">
-              <a14:hiddenEffects xmlns:a14="http://schemas.microsoft.com/office/drawing/2010/main" xmlns="">
+              <a14:hiddenEffects xmlns="" xmlns:a14="http://schemas.microsoft.com/office/drawing/2010/main">
                 <a:effectLst>
                   <a:outerShdw blurRad="63500" dist="38099" dir="2700000" algn="ctr" rotWithShape="0">
                     <a:schemeClr val="bg2">
@@ -6871,14 +6871,14 @@
           <a:effectLst/>
           <a:extLst>
             <a:ext uri="{909E8E84-426E-40dd-AFC4-6F175D3DCCD1}">
-              <a14:hiddenFill xmlns:a14="http://schemas.microsoft.com/office/drawing/2010/main" xmlns="">
+              <a14:hiddenFill xmlns="" xmlns:a14="http://schemas.microsoft.com/office/drawing/2010/main">
                 <a:solidFill>
                   <a:schemeClr val="accent1"/>
                 </a:solidFill>
               </a14:hiddenFill>
             </a:ext>
             <a:ext uri="{AF507438-7753-43e0-B8FC-AC1667EBCBE1}">
-              <a14:hiddenEffects xmlns:a14="http://schemas.microsoft.com/office/drawing/2010/main" xmlns="">
+              <a14:hiddenEffects xmlns="" xmlns:a14="http://schemas.microsoft.com/office/drawing/2010/main">
                 <a:effectLst>
                   <a:outerShdw blurRad="63500" dist="38099" dir="2700000" algn="ctr" rotWithShape="0">
                     <a:schemeClr val="bg2">
@@ -6926,12 +6926,12 @@
           <a:effectLst/>
           <a:extLst>
             <a:ext uri="{909E8E84-426E-40dd-AFC4-6F175D3DCCD1}">
-              <a14:hiddenFill xmlns:a14="http://schemas.microsoft.com/office/drawing/2010/main" xmlns="">
+              <a14:hiddenFill xmlns="" xmlns:a14="http://schemas.microsoft.com/office/drawing/2010/main">
                 <a:noFill/>
               </a14:hiddenFill>
             </a:ext>
             <a:ext uri="{AF507438-7753-43e0-B8FC-AC1667EBCBE1}">
-              <a14:hiddenEffects xmlns:a14="http://schemas.microsoft.com/office/drawing/2010/main" xmlns="">
+              <a14:hiddenEffects xmlns="" xmlns:a14="http://schemas.microsoft.com/office/drawing/2010/main">
                 <a:effectLst>
                   <a:outerShdw blurRad="63500" dist="38099" dir="2700000" algn="ctr" rotWithShape="0">
                     <a:schemeClr val="bg2">
@@ -7087,14 +7087,14 @@
           <a:effectLst/>
           <a:extLst>
             <a:ext uri="{909E8E84-426E-40dd-AFC4-6F175D3DCCD1}">
-              <a14:hiddenFill xmlns:a14="http://schemas.microsoft.com/office/drawing/2010/main" xmlns="">
+              <a14:hiddenFill xmlns="" xmlns:a14="http://schemas.microsoft.com/office/drawing/2010/main">
                 <a:solidFill>
                   <a:schemeClr val="accent1"/>
                 </a:solidFill>
               </a14:hiddenFill>
             </a:ext>
             <a:ext uri="{91240B29-F687-4f45-9708-019B960494DF}">
-              <a14:hiddenLine xmlns:a14="http://schemas.microsoft.com/office/drawing/2010/main" xmlns="" w="9525">
+              <a14:hiddenLine xmlns="" xmlns:a14="http://schemas.microsoft.com/office/drawing/2010/main" w="9525">
                 <a:solidFill>
                   <a:schemeClr val="tx1"/>
                 </a:solidFill>
@@ -7104,7 +7104,7 @@
               </a14:hiddenLine>
             </a:ext>
             <a:ext uri="{AF507438-7753-43e0-B8FC-AC1667EBCBE1}">
-              <a14:hiddenEffects xmlns:a14="http://schemas.microsoft.com/office/drawing/2010/main" xmlns="">
+              <a14:hiddenEffects xmlns="" xmlns:a14="http://schemas.microsoft.com/office/drawing/2010/main">
                 <a:effectLst>
                   <a:outerShdw blurRad="63500" dist="38099" dir="2700000" algn="ctr" rotWithShape="0">
                     <a:schemeClr val="bg2">
@@ -7192,14 +7192,14 @@
           <a:effectLst/>
           <a:extLst>
             <a:ext uri="{909E8E84-426E-40dd-AFC4-6F175D3DCCD1}">
-              <a14:hiddenFill xmlns:a14="http://schemas.microsoft.com/office/drawing/2010/main" xmlns="">
+              <a14:hiddenFill xmlns="" xmlns:a14="http://schemas.microsoft.com/office/drawing/2010/main">
                 <a:solidFill>
                   <a:schemeClr val="accent1"/>
                 </a:solidFill>
               </a14:hiddenFill>
             </a:ext>
             <a:ext uri="{91240B29-F687-4f45-9708-019B960494DF}">
-              <a14:hiddenLine xmlns:a14="http://schemas.microsoft.com/office/drawing/2010/main" xmlns="" w="9525">
+              <a14:hiddenLine xmlns="" xmlns:a14="http://schemas.microsoft.com/office/drawing/2010/main" w="9525">
                 <a:solidFill>
                   <a:schemeClr val="tx1"/>
                 </a:solidFill>
@@ -7209,7 +7209,7 @@
               </a14:hiddenLine>
             </a:ext>
             <a:ext uri="{AF507438-7753-43e0-B8FC-AC1667EBCBE1}">
-              <a14:hiddenEffects xmlns:a14="http://schemas.microsoft.com/office/drawing/2010/main" xmlns="">
+              <a14:hiddenEffects xmlns="" xmlns:a14="http://schemas.microsoft.com/office/drawing/2010/main">
                 <a:effectLst>
                   <a:outerShdw blurRad="63500" dist="38099" dir="2700000" algn="ctr" rotWithShape="0">
                     <a:schemeClr val="bg2">
@@ -7262,12 +7262,12 @@
           <a:effectLst/>
           <a:extLst>
             <a:ext uri="{909E8E84-426E-40dd-AFC4-6F175D3DCCD1}">
-              <a14:hiddenFill xmlns:a14="http://schemas.microsoft.com/office/drawing/2010/main" xmlns="">
+              <a14:hiddenFill xmlns="" xmlns:a14="http://schemas.microsoft.com/office/drawing/2010/main">
                 <a:noFill/>
               </a14:hiddenFill>
             </a:ext>
             <a:ext uri="{AF507438-7753-43e0-B8FC-AC1667EBCBE1}">
-              <a14:hiddenEffects xmlns:a14="http://schemas.microsoft.com/office/drawing/2010/main" xmlns="">
+              <a14:hiddenEffects xmlns="" xmlns:a14="http://schemas.microsoft.com/office/drawing/2010/main">
                 <a:effectLst>
                   <a:outerShdw blurRad="63500" dist="38099" dir="2700000" algn="ctr" rotWithShape="0">
                     <a:schemeClr val="bg2">
@@ -7312,7 +7312,7 @@
           <a:effectLst/>
           <a:extLst>
             <a:ext uri="{91240B29-F687-4f45-9708-019B960494DF}">
-              <a14:hiddenLine xmlns:a14="http://schemas.microsoft.com/office/drawing/2010/main" xmlns="" w="9525">
+              <a14:hiddenLine xmlns="" xmlns:a14="http://schemas.microsoft.com/office/drawing/2010/main" w="9525">
                 <a:solidFill>
                   <a:schemeClr val="tx1"/>
                 </a:solidFill>
@@ -7322,7 +7322,7 @@
               </a14:hiddenLine>
             </a:ext>
             <a:ext uri="{AF507438-7753-43e0-B8FC-AC1667EBCBE1}">
-              <a14:hiddenEffects xmlns:a14="http://schemas.microsoft.com/office/drawing/2010/main" xmlns="">
+              <a14:hiddenEffects xmlns="" xmlns:a14="http://schemas.microsoft.com/office/drawing/2010/main">
                 <a:effectLst>
                   <a:outerShdw blurRad="63500" dist="38099" dir="2700000" algn="ctr" rotWithShape="0">
                     <a:schemeClr val="bg2">
@@ -7370,14 +7370,14 @@
           <a:effectLst/>
           <a:extLst>
             <a:ext uri="{909E8E84-426E-40dd-AFC4-6F175D3DCCD1}">
-              <a14:hiddenFill xmlns:a14="http://schemas.microsoft.com/office/drawing/2010/main" xmlns="">
+              <a14:hiddenFill xmlns="" xmlns:a14="http://schemas.microsoft.com/office/drawing/2010/main">
                 <a:solidFill>
                   <a:schemeClr val="accent1"/>
                 </a:solidFill>
               </a14:hiddenFill>
             </a:ext>
             <a:ext uri="{91240B29-F687-4f45-9708-019B960494DF}">
-              <a14:hiddenLine xmlns:a14="http://schemas.microsoft.com/office/drawing/2010/main" xmlns="" w="9525">
+              <a14:hiddenLine xmlns="" xmlns:a14="http://schemas.microsoft.com/office/drawing/2010/main" w="9525">
                 <a:solidFill>
                   <a:schemeClr val="tx1"/>
                 </a:solidFill>
@@ -7387,7 +7387,7 @@
               </a14:hiddenLine>
             </a:ext>
             <a:ext uri="{AF507438-7753-43e0-B8FC-AC1667EBCBE1}">
-              <a14:hiddenEffects xmlns:a14="http://schemas.microsoft.com/office/drawing/2010/main" xmlns="">
+              <a14:hiddenEffects xmlns="" xmlns:a14="http://schemas.microsoft.com/office/drawing/2010/main">
                 <a:effectLst>
                   <a:outerShdw blurRad="63500" dist="38099" dir="2700000" algn="ctr" rotWithShape="0">
                     <a:schemeClr val="bg2">
@@ -7511,7 +7511,7 @@
           <a:noFill/>
           <a:extLst>
             <a:ext uri="{909E8E84-426E-40dd-AFC4-6F175D3DCCD1}">
-              <a14:hiddenFill xmlns:a14="http://schemas.microsoft.com/office/drawing/2010/main" xmlns="">
+              <a14:hiddenFill xmlns="" xmlns:a14="http://schemas.microsoft.com/office/drawing/2010/main">
                 <a:solidFill>
                   <a:srgbClr val="FFFFFF"/>
                 </a:solidFill>
@@ -7543,14 +7543,14 @@
           <a:effectLst/>
           <a:extLst>
             <a:ext uri="{909E8E84-426E-40dd-AFC4-6F175D3DCCD1}">
-              <a14:hiddenFill xmlns:a14="http://schemas.microsoft.com/office/drawing/2010/main" xmlns="">
+              <a14:hiddenFill xmlns="" xmlns:a14="http://schemas.microsoft.com/office/drawing/2010/main">
                 <a:solidFill>
                   <a:schemeClr val="accent1"/>
                 </a:solidFill>
               </a14:hiddenFill>
             </a:ext>
             <a:ext uri="{91240B29-F687-4f45-9708-019B960494DF}">
-              <a14:hiddenLine xmlns:a14="http://schemas.microsoft.com/office/drawing/2010/main" xmlns="" w="9525">
+              <a14:hiddenLine xmlns="" xmlns:a14="http://schemas.microsoft.com/office/drawing/2010/main" w="9525">
                 <a:solidFill>
                   <a:schemeClr val="tx1"/>
                 </a:solidFill>
@@ -7560,7 +7560,7 @@
               </a14:hiddenLine>
             </a:ext>
             <a:ext uri="{AF507438-7753-43e0-B8FC-AC1667EBCBE1}">
-              <a14:hiddenEffects xmlns:a14="http://schemas.microsoft.com/office/drawing/2010/main" xmlns="">
+              <a14:hiddenEffects xmlns="" xmlns:a14="http://schemas.microsoft.com/office/drawing/2010/main">
                 <a:effectLst>
                   <a:outerShdw blurRad="63500" dist="38099" dir="2700000" algn="ctr" rotWithShape="0">
                     <a:schemeClr val="bg2">
@@ -7687,14 +7687,14 @@
           <a:effectLst/>
           <a:extLst>
             <a:ext uri="{909E8E84-426E-40dd-AFC4-6F175D3DCCD1}">
-              <a14:hiddenFill xmlns:a14="http://schemas.microsoft.com/office/drawing/2010/main" xmlns="">
+              <a14:hiddenFill xmlns="" xmlns:a14="http://schemas.microsoft.com/office/drawing/2010/main">
                 <a:solidFill>
                   <a:schemeClr val="accent1"/>
                 </a:solidFill>
               </a14:hiddenFill>
             </a:ext>
             <a:ext uri="{AF507438-7753-43e0-B8FC-AC1667EBCBE1}">
-              <a14:hiddenEffects xmlns:a14="http://schemas.microsoft.com/office/drawing/2010/main" xmlns="">
+              <a14:hiddenEffects xmlns="" xmlns:a14="http://schemas.microsoft.com/office/drawing/2010/main">
                 <a:effectLst>
                   <a:outerShdw blurRad="63500" dist="38099" dir="2700000" algn="ctr" rotWithShape="0">
                     <a:schemeClr val="bg2">
@@ -8493,8 +8493,8 @@
         </p:blipFill>
         <p:spPr>
           <a:xfrm>
-            <a:off x="3602184" y="6114"/>
-            <a:ext cx="4987635" cy="6845775"/>
+            <a:off x="3602183" y="6113"/>
+            <a:ext cx="4991296" cy="6850800"/>
           </a:xfrm>
           <a:prstGeom prst="rect">
             <a:avLst/>
@@ -10160,7 +10160,7 @@
         </p:blipFill>
         <p:spPr>
           <a:xfrm>
-            <a:off x="9476930" y="12842"/>
+            <a:off x="10055664" y="436139"/>
             <a:ext cx="1191070" cy="2578666"/>
           </a:xfrm>
           <a:prstGeom prst="rect">
@@ -11938,14 +11938,14 @@
           <a:effectLst/>
           <a:extLst>
             <a:ext uri="{909E8E84-426E-40dd-AFC4-6F175D3DCCD1}">
-              <a14:hiddenFill xmlns:a14="http://schemas.microsoft.com/office/drawing/2010/main" xmlns="">
+              <a14:hiddenFill xmlns="" xmlns:a14="http://schemas.microsoft.com/office/drawing/2010/main">
                 <a:solidFill>
                   <a:schemeClr val="accent1"/>
                 </a:solidFill>
               </a14:hiddenFill>
             </a:ext>
             <a:ext uri="{91240B29-F687-4f45-9708-019B960494DF}">
-              <a14:hiddenLine xmlns:a14="http://schemas.microsoft.com/office/drawing/2010/main" xmlns="" w="9525">
+              <a14:hiddenLine xmlns="" xmlns:a14="http://schemas.microsoft.com/office/drawing/2010/main" w="9525">
                 <a:solidFill>
                   <a:schemeClr val="tx1"/>
                 </a:solidFill>
@@ -11955,7 +11955,7 @@
               </a14:hiddenLine>
             </a:ext>
             <a:ext uri="{AF507438-7753-43e0-B8FC-AC1667EBCBE1}">
-              <a14:hiddenEffects xmlns:a14="http://schemas.microsoft.com/office/drawing/2010/main" xmlns="">
+              <a14:hiddenEffects xmlns="" xmlns:a14="http://schemas.microsoft.com/office/drawing/2010/main">
                 <a:effectLst>
                   <a:outerShdw blurRad="63500" dist="38099" dir="2700000" algn="ctr" rotWithShape="0">
                     <a:schemeClr val="bg2">
@@ -12232,7 +12232,7 @@
           <a:effectLst/>
           <a:extLst>
             <a:ext uri="{91240B29-F687-4f45-9708-019B960494DF}">
-              <a14:hiddenLine xmlns:a14="http://schemas.microsoft.com/office/drawing/2010/main" xmlns="" w="9525">
+              <a14:hiddenLine xmlns="" xmlns:a14="http://schemas.microsoft.com/office/drawing/2010/main" w="9525">
                 <a:solidFill>
                   <a:schemeClr val="tx1"/>
                 </a:solidFill>
@@ -12242,7 +12242,7 @@
               </a14:hiddenLine>
             </a:ext>
             <a:ext uri="{AF507438-7753-43e0-B8FC-AC1667EBCBE1}">
-              <a14:hiddenEffects xmlns:a14="http://schemas.microsoft.com/office/drawing/2010/main" xmlns="">
+              <a14:hiddenEffects xmlns="" xmlns:a14="http://schemas.microsoft.com/office/drawing/2010/main">
                 <a:effectLst>
                   <a:outerShdw blurRad="63500" dist="38099" dir="2700000" algn="ctr" rotWithShape="0">
                     <a:schemeClr val="bg2">

</xml_diff>